<commit_message>
Lecture 9 live updates C00/D00
</commit_message>
<xml_diff>
--- a/lectures/lecture-09/Lecture-Live C00/Lecture 09 - Lecture.pptx
+++ b/lectures/lecture-09/Lecture-Live C00/Lecture 09 - Lecture.pptx
@@ -838,7 +838,7 @@
           <a:p>
             <a:fld id="{3A2BF66F-FEB0-48C1-A8B9-A73F54BB1A08}" type="datetimeFigureOut">
               <a:rPr lang="en-US" smtClean="0"/>
-              <a:t>1/24/2021</a:t>
+              <a:t>1/25/2021</a:t>
             </a:fld>
             <a:endParaRPr lang="en-US"/>
           </a:p>
@@ -1038,7 +1038,7 @@
           <a:p>
             <a:fld id="{3A2BF66F-FEB0-48C1-A8B9-A73F54BB1A08}" type="datetimeFigureOut">
               <a:rPr lang="en-US" smtClean="0"/>
-              <a:t>1/24/2021</a:t>
+              <a:t>1/25/2021</a:t>
             </a:fld>
             <a:endParaRPr lang="en-US"/>
           </a:p>
@@ -1248,7 +1248,7 @@
           <a:p>
             <a:fld id="{3A2BF66F-FEB0-48C1-A8B9-A73F54BB1A08}" type="datetimeFigureOut">
               <a:rPr lang="en-US" smtClean="0"/>
-              <a:t>1/24/2021</a:t>
+              <a:t>1/25/2021</a:t>
             </a:fld>
             <a:endParaRPr lang="en-US"/>
           </a:p>
@@ -1448,7 +1448,7 @@
           <a:p>
             <a:fld id="{3A2BF66F-FEB0-48C1-A8B9-A73F54BB1A08}" type="datetimeFigureOut">
               <a:rPr lang="en-US" smtClean="0"/>
-              <a:t>1/24/2021</a:t>
+              <a:t>1/25/2021</a:t>
             </a:fld>
             <a:endParaRPr lang="en-US"/>
           </a:p>
@@ -1725,7 +1725,7 @@
           <a:p>
             <a:fld id="{3A2BF66F-FEB0-48C1-A8B9-A73F54BB1A08}" type="datetimeFigureOut">
               <a:rPr lang="en-US" smtClean="0"/>
-              <a:t>1/24/2021</a:t>
+              <a:t>1/25/2021</a:t>
             </a:fld>
             <a:endParaRPr lang="en-US"/>
           </a:p>
@@ -1992,7 +1992,7 @@
           <a:p>
             <a:fld id="{3A2BF66F-FEB0-48C1-A8B9-A73F54BB1A08}" type="datetimeFigureOut">
               <a:rPr lang="en-US" smtClean="0"/>
-              <a:t>1/24/2021</a:t>
+              <a:t>1/25/2021</a:t>
             </a:fld>
             <a:endParaRPr lang="en-US"/>
           </a:p>
@@ -2406,7 +2406,7 @@
           <a:p>
             <a:fld id="{3A2BF66F-FEB0-48C1-A8B9-A73F54BB1A08}" type="datetimeFigureOut">
               <a:rPr lang="en-US" smtClean="0"/>
-              <a:t>1/24/2021</a:t>
+              <a:t>1/25/2021</a:t>
             </a:fld>
             <a:endParaRPr lang="en-US"/>
           </a:p>
@@ -2549,7 +2549,7 @@
           <a:p>
             <a:fld id="{3A2BF66F-FEB0-48C1-A8B9-A73F54BB1A08}" type="datetimeFigureOut">
               <a:rPr lang="en-US" smtClean="0"/>
-              <a:t>1/24/2021</a:t>
+              <a:t>1/25/2021</a:t>
             </a:fld>
             <a:endParaRPr lang="en-US"/>
           </a:p>
@@ -2664,7 +2664,7 @@
           <a:p>
             <a:fld id="{3A2BF66F-FEB0-48C1-A8B9-A73F54BB1A08}" type="datetimeFigureOut">
               <a:rPr lang="en-US" smtClean="0"/>
-              <a:t>1/24/2021</a:t>
+              <a:t>1/25/2021</a:t>
             </a:fld>
             <a:endParaRPr lang="en-US"/>
           </a:p>
@@ -2976,7 +2976,7 @@
           <a:p>
             <a:fld id="{3A2BF66F-FEB0-48C1-A8B9-A73F54BB1A08}" type="datetimeFigureOut">
               <a:rPr lang="en-US" smtClean="0"/>
-              <a:t>1/24/2021</a:t>
+              <a:t>1/25/2021</a:t>
             </a:fld>
             <a:endParaRPr lang="en-US"/>
           </a:p>
@@ -3266,7 +3266,7 @@
           <a:p>
             <a:fld id="{3A2BF66F-FEB0-48C1-A8B9-A73F54BB1A08}" type="datetimeFigureOut">
               <a:rPr lang="en-US" smtClean="0"/>
-              <a:t>1/24/2021</a:t>
+              <a:t>1/25/2021</a:t>
             </a:fld>
             <a:endParaRPr lang="en-US"/>
           </a:p>
@@ -3509,7 +3509,7 @@
           <a:p>
             <a:fld id="{3A2BF66F-FEB0-48C1-A8B9-A73F54BB1A08}" type="datetimeFigureOut">
               <a:rPr lang="en-US" smtClean="0"/>
-              <a:t>1/24/2021</a:t>
+              <a:t>1/25/2021</a:t>
             </a:fld>
             <a:endParaRPr lang="en-US"/>
           </a:p>
@@ -4174,7 +4174,7 @@
             </a:r>
             <a:r>
               <a:rPr lang="en-US" dirty="0" err="1"/>
-              <a:t>8am</a:t>
+              <a:t>10am</a:t>
             </a:r>
             <a:endParaRPr lang="en-US" dirty="0"/>
           </a:p>

</xml_diff>